<commit_message>
good/bad user list in 406/410 && log analysis result wrapup.ppt
</commit_message>
<xml_diff>
--- a/160322 로그분석.pptx
+++ b/160322 로그분석.pptx
@@ -229,7 +229,7 @@
           <a:p>
             <a:fld id="{A091CFA2-36EB-42F2-8E3B-3F39B3DDAF8A}" type="datetimeFigureOut">
               <a:rPr lang="ko-KR" altLang="en-US" smtClean="0"/>
-              <a:t>2016-03-21</a:t>
+              <a:t>2016-04-19</a:t>
             </a:fld>
             <a:endParaRPr lang="ko-KR" altLang="en-US"/>
           </a:p>
@@ -1014,20 +1014,6 @@
           <a:bodyPr/>
           <a:lstStyle/>
           <a:p>
-            <a:pPr lvl="1"/>
-            <a:r>
-              <a:rPr lang="ko-KR" altLang="en-US" dirty="0" smtClean="0"/>
-              <a:t>초록색이 좋은 그룹 </a:t>
-            </a:r>
-          </a:p>
-          <a:p>
-            <a:pPr lvl="1"/>
-            <a:r>
-              <a:rPr lang="ko-KR" altLang="en-US" dirty="0" smtClean="0"/>
-              <a:t>보라색이 아웃라이어와 같은 안좋은 그룹</a:t>
-            </a:r>
-          </a:p>
-          <a:p>
             <a:endParaRPr lang="ko-KR" altLang="en-US" dirty="0"/>
           </a:p>
         </p:txBody>
@@ -1049,6 +1035,104 @@
           <a:p>
             <a:fld id="{57BE8536-040E-4CCE-879B-999FB22E1B35}" type="slidenum">
               <a:rPr lang="ko-KR" altLang="en-US" smtClean="0"/>
+              <a:t>17</a:t>
+            </a:fld>
+            <a:endParaRPr lang="ko-KR" altLang="en-US"/>
+          </a:p>
+        </p:txBody>
+      </p:sp>
+    </p:spTree>
+    <p:extLst>
+      <p:ext uri="{BB962C8B-B14F-4D97-AF65-F5344CB8AC3E}">
+        <p14:creationId xmlns:p14="http://schemas.microsoft.com/office/powerpoint/2010/main" val="120103222"/>
+      </p:ext>
+    </p:extLst>
+  </p:cSld>
+  <p:clrMapOvr>
+    <a:masterClrMapping/>
+  </p:clrMapOvr>
+</p:notes>
+</file>
+
+<file path=ppt/notesSlides/notesSlide6.xml><?xml version="1.0" encoding="utf-8"?>
+<p:notes xmlns:a="http://schemas.openxmlformats.org/drawingml/2006/main" xmlns:r="http://schemas.openxmlformats.org/officeDocument/2006/relationships" xmlns:p="http://schemas.openxmlformats.org/presentationml/2006/main">
+  <p:cSld>
+    <p:spTree>
+      <p:nvGrpSpPr>
+        <p:cNvPr id="1" name=""/>
+        <p:cNvGrpSpPr/>
+        <p:nvPr/>
+      </p:nvGrpSpPr>
+      <p:grpSpPr>
+        <a:xfrm>
+          <a:off x="0" y="0"/>
+          <a:ext cx="0" cy="0"/>
+          <a:chOff x="0" y="0"/>
+          <a:chExt cx="0" cy="0"/>
+        </a:xfrm>
+      </p:grpSpPr>
+      <p:sp>
+        <p:nvSpPr>
+          <p:cNvPr id="2" name="슬라이드 이미지 개체 틀 1"/>
+          <p:cNvSpPr>
+            <a:spLocks noGrp="1" noRot="1" noChangeAspect="1"/>
+          </p:cNvSpPr>
+          <p:nvPr>
+            <p:ph type="sldImg"/>
+          </p:nvPr>
+        </p:nvSpPr>
+        <p:spPr/>
+      </p:sp>
+      <p:sp>
+        <p:nvSpPr>
+          <p:cNvPr id="3" name="슬라이드 노트 개체 틀 2"/>
+          <p:cNvSpPr>
+            <a:spLocks noGrp="1"/>
+          </p:cNvSpPr>
+          <p:nvPr>
+            <p:ph type="body" idx="1"/>
+          </p:nvPr>
+        </p:nvSpPr>
+        <p:spPr/>
+        <p:txBody>
+          <a:bodyPr/>
+          <a:lstStyle/>
+          <a:p>
+            <a:pPr lvl="1"/>
+            <a:r>
+              <a:rPr lang="ko-KR" altLang="en-US" dirty="0" smtClean="0"/>
+              <a:t>초록색이 좋은 그룹 </a:t>
+            </a:r>
+          </a:p>
+          <a:p>
+            <a:pPr lvl="1"/>
+            <a:r>
+              <a:rPr lang="ko-KR" altLang="en-US" dirty="0" smtClean="0"/>
+              <a:t>보라색이 아웃라이어와 같은 안좋은 그룹</a:t>
+            </a:r>
+          </a:p>
+          <a:p>
+            <a:endParaRPr lang="ko-KR" altLang="en-US" dirty="0"/>
+          </a:p>
+        </p:txBody>
+      </p:sp>
+      <p:sp>
+        <p:nvSpPr>
+          <p:cNvPr id="4" name="슬라이드 번호 개체 틀 3"/>
+          <p:cNvSpPr>
+            <a:spLocks noGrp="1"/>
+          </p:cNvSpPr>
+          <p:nvPr>
+            <p:ph type="sldNum" sz="quarter" idx="10"/>
+          </p:nvPr>
+        </p:nvSpPr>
+        <p:spPr/>
+        <p:txBody>
+          <a:bodyPr/>
+          <a:lstStyle/>
+          <a:p>
+            <a:fld id="{57BE8536-040E-4CCE-879B-999FB22E1B35}" type="slidenum">
+              <a:rPr lang="ko-KR" altLang="en-US" smtClean="0"/>
               <a:t>18</a:t>
             </a:fld>
             <a:endParaRPr lang="ko-KR" altLang="en-US"/>
@@ -1068,7 +1152,7 @@
 </p:notes>
 </file>
 
-<file path=ppt/notesSlides/notesSlide6.xml><?xml version="1.0" encoding="utf-8"?>
+<file path=ppt/notesSlides/notesSlide7.xml><?xml version="1.0" encoding="utf-8"?>
 <p:notes xmlns:a="http://schemas.openxmlformats.org/drawingml/2006/main" xmlns:r="http://schemas.openxmlformats.org/officeDocument/2006/relationships" xmlns:p="http://schemas.openxmlformats.org/presentationml/2006/main">
   <p:cSld>
     <p:spTree>
@@ -4008,13 +4092,7 @@
               <a:rPr lang="en-US" altLang="ko-KR" dirty="0" smtClean="0">
                 <a:effectLst/>
               </a:rPr>
-              <a:t>(</a:t>
-            </a:r>
-            <a:r>
-              <a:rPr lang="en-US" altLang="ko-KR" dirty="0" smtClean="0">
-                <a:effectLst/>
-              </a:rPr>
-              <a:t>cont’d)</a:t>
+              <a:t>(cont’d)</a:t>
             </a:r>
             <a:r>
               <a:rPr lang="ko-KR" altLang="en-US" dirty="0" smtClean="0">
@@ -5105,13 +5183,7 @@
               <a:rPr lang="en-US" altLang="ko-KR" dirty="0" smtClean="0">
                 <a:effectLst/>
               </a:rPr>
-              <a:t>(</a:t>
-            </a:r>
-            <a:r>
-              <a:rPr lang="en-US" altLang="ko-KR" dirty="0" smtClean="0">
-                <a:effectLst/>
-              </a:rPr>
-              <a:t>cont’d)</a:t>
+              <a:t>(cont’d)</a:t>
             </a:r>
             <a:r>
               <a:rPr lang="ko-KR" altLang="en-US" dirty="0" smtClean="0">
@@ -5158,11 +5230,7 @@
             </a:r>
             <a:r>
               <a:rPr lang="ko-KR" altLang="en-US" dirty="0" smtClean="0"/>
-              <a:t>에서</a:t>
-            </a:r>
-            <a:r>
-              <a:rPr lang="ko-KR" altLang="en-US" dirty="0" smtClean="0"/>
-              <a:t> </a:t>
+              <a:t>에서 </a:t>
             </a:r>
             <a:r>
               <a:rPr lang="ko-KR" altLang="en-US" dirty="0"/>
@@ -5947,20 +6015,14 @@
               <a:rPr lang="en-US" altLang="ko-KR" dirty="0" smtClean="0">
                 <a:effectLst/>
               </a:rPr>
-              <a:t>(</a:t>
-            </a:r>
-            <a:r>
-              <a:rPr lang="en-US" altLang="ko-KR" dirty="0" smtClean="0">
-                <a:effectLst/>
-              </a:rPr>
-              <a:t>cont’d)</a:t>
+              <a:t>(cont’d)</a:t>
             </a:r>
             <a:endParaRPr lang="ko-KR" altLang="en-US" dirty="0"/>
           </a:p>
         </p:txBody>
       </p:sp>
-      <mc:AlternateContent xmlns:mc="http://schemas.openxmlformats.org/markup-compatibility/2006">
-        <mc:Choice xmlns:a14="http://schemas.microsoft.com/office/drawing/2010/main" Requires="a14">
+      <mc:AlternateContent xmlns:mc="http://schemas.openxmlformats.org/markup-compatibility/2006" xmlns:a14="http://schemas.microsoft.com/office/drawing/2010/main">
+        <mc:Choice Requires="a14">
           <p:sp>
             <p:nvSpPr>
               <p:cNvPr id="3" name="내용 개체 틀 2"/>
@@ -5980,15 +6042,7 @@
               <a:p>
                 <a:r>
                   <a:rPr lang="en-US" altLang="ko-KR" dirty="0" smtClean="0"/>
-                  <a:t>T</a:t>
-                </a:r>
-                <a:r>
-                  <a:rPr lang="en-US" altLang="ko-KR" dirty="0" smtClean="0"/>
-                  <a:t>ime</a:t>
-                </a:r>
-                <a:r>
-                  <a:rPr lang="en-US" altLang="ko-KR" dirty="0" smtClean="0"/>
-                  <a:t>stamp </a:t>
+                  <a:t>Timestamp </a:t>
                 </a:r>
                 <a:r>
                   <a:rPr lang="ko-KR" altLang="en-US" dirty="0" smtClean="0"/>
@@ -5996,11 +6050,7 @@
                 </a:r>
                 <a:r>
                   <a:rPr lang="en-US" altLang="ko-KR" dirty="0" smtClean="0"/>
-                  <a:t>: </a:t>
-                </a:r>
-                <a:r>
-                  <a:rPr lang="en-US" altLang="ko-KR" dirty="0" smtClean="0"/>
-                  <a:t>#(</a:t>
+                  <a:t>: #(</a:t>
                 </a:r>
                 <a:r>
                   <a:rPr lang="ko-KR" altLang="en-US" dirty="0" smtClean="0"/>
@@ -6086,7 +6136,6 @@
                   <a:rPr lang="en-US" altLang="ko-KR" dirty="0"/>
                   <a:t>Sim, 4-2, 12, 2, 1, 0,</a:t>
                 </a:r>
-                <a:endParaRPr lang="en-US" altLang="ko-KR" dirty="0"/>
               </a:p>
               <a:p>
                 <a:pPr lvl="2"/>
@@ -6143,11 +6192,7 @@
                 </a:r>
                 <a:r>
                   <a:rPr lang="ko-KR" altLang="en-US" dirty="0" smtClean="0"/>
-                  <a:t>이벤트 이후 다음</a:t>
-                </a:r>
-                <a:r>
-                  <a:rPr lang="ko-KR" altLang="en-US" dirty="0" smtClean="0"/>
-                  <a:t> </a:t>
+                  <a:t>이벤트 이후 다음 </a:t>
                 </a:r>
                 <a:r>
                   <a:rPr lang="ko-KR" altLang="en-US" dirty="0"/>
@@ -6197,7 +6242,7 @@
             </p:txBody>
           </p:sp>
         </mc:Choice>
-        <mc:Fallback>
+        <mc:Fallback xmlns="">
           <p:sp>
             <p:nvSpPr>
               <p:cNvPr id="3" name="내용 개체 틀 2"/>
@@ -7524,12 +7569,6 @@
               </a:rPr>
               <a:t>어려워함</a:t>
             </a:r>
-            <a:endParaRPr lang="ko-KR" altLang="en-US" sz="2000" b="1" dirty="0" smtClean="0">
-              <a:solidFill>
-                <a:schemeClr val="tx1"/>
-              </a:solidFill>
-              <a:ea typeface="굴림" charset="-127"/>
-            </a:endParaRPr>
           </a:p>
         </p:txBody>
       </p:sp>
@@ -7600,12 +7639,6 @@
               </a:rPr>
               <a:t>잘함</a:t>
             </a:r>
-            <a:endParaRPr lang="ko-KR" altLang="en-US" sz="2000" b="1" dirty="0" smtClean="0">
-              <a:solidFill>
-                <a:schemeClr val="tx1"/>
-              </a:solidFill>
-              <a:ea typeface="굴림" charset="-127"/>
-            </a:endParaRPr>
           </a:p>
         </p:txBody>
       </p:sp>
@@ -8412,7 +8445,7 @@
             <p:nvPr/>
           </p:nvPicPr>
           <p:blipFill>
-            <a:blip r:embed="rId2"/>
+            <a:blip r:embed="rId3"/>
             <a:stretch>
               <a:fillRect/>
             </a:stretch>
@@ -8434,9 +8467,9 @@
             <p:nvPr/>
           </p:nvCxnSpPr>
           <p:spPr bwMode="auto">
-            <a:xfrm>
-              <a:off x="4400550" y="5162099"/>
-              <a:ext cx="0" cy="515252"/>
+            <a:xfrm flipH="1">
+              <a:off x="5901690" y="5467900"/>
+              <a:ext cx="5715" cy="245089"/>
             </a:xfrm>
             <a:prstGeom prst="straightConnector1">
               <a:avLst/>
@@ -8462,6 +8495,30 @@
           </p:style>
         </p:cxnSp>
       </p:grpSp>
+      <p:pic>
+        <p:nvPicPr>
+          <p:cNvPr id="5" name="그림 4"/>
+          <p:cNvPicPr>
+            <a:picLocks noChangeAspect="1"/>
+          </p:cNvPicPr>
+          <p:nvPr/>
+        </p:nvPicPr>
+        <p:blipFill>
+          <a:blip r:embed="rId4"/>
+          <a:stretch>
+            <a:fillRect/>
+          </a:stretch>
+        </p:blipFill>
+        <p:spPr>
+          <a:xfrm>
+            <a:off x="4545120" y="1854569"/>
+            <a:ext cx="4090771" cy="3194581"/>
+          </a:xfrm>
+          <a:prstGeom prst="rect">
+            <a:avLst/>
+          </a:prstGeom>
+        </p:spPr>
+      </p:pic>
     </p:spTree>
     <p:extLst>
       <p:ext uri="{BB962C8B-B14F-4D97-AF65-F5344CB8AC3E}">
@@ -8922,8 +8979,8 @@
             </a:p>
           </p:txBody>
         </p:sp>
-        <mc:AlternateContent xmlns:mc="http://schemas.openxmlformats.org/markup-compatibility/2006">
-          <mc:Choice xmlns:a14="http://schemas.microsoft.com/office/drawing/2010/main" Requires="a14">
+        <mc:AlternateContent xmlns:mc="http://schemas.openxmlformats.org/markup-compatibility/2006" xmlns:a14="http://schemas.microsoft.com/office/drawing/2010/main">
+          <mc:Choice Requires="a14">
             <p:sp>
               <p:nvSpPr>
                 <p:cNvPr id="15" name="TextBox 14"/>
@@ -8974,7 +9031,7 @@
               </p:txBody>
             </p:sp>
           </mc:Choice>
-          <mc:Fallback>
+          <mc:Fallback xmlns="">
             <p:sp>
               <p:nvSpPr>
                 <p:cNvPr id="15" name="TextBox 14"/>
@@ -9423,8 +9480,8 @@
           </a:prstGeom>
         </p:spPr>
       </p:pic>
-      <mc:AlternateContent xmlns:mc="http://schemas.openxmlformats.org/markup-compatibility/2006">
-        <mc:Choice xmlns:a14="http://schemas.microsoft.com/office/drawing/2010/main" Requires="a14">
+      <mc:AlternateContent xmlns:mc="http://schemas.openxmlformats.org/markup-compatibility/2006" xmlns:a14="http://schemas.microsoft.com/office/drawing/2010/main">
+        <mc:Choice Requires="a14">
           <p:sp>
             <p:nvSpPr>
               <p:cNvPr id="18" name="직사각형 17"/>
@@ -9554,7 +9611,7 @@
             </p:txBody>
           </p:sp>
         </mc:Choice>
-        <mc:Fallback>
+        <mc:Fallback xmlns="">
           <p:sp>
             <p:nvSpPr>
               <p:cNvPr id="18" name="직사각형 17"/>
@@ -9596,8 +9653,8 @@
           </p:sp>
         </mc:Fallback>
       </mc:AlternateContent>
-      <mc:AlternateContent xmlns:mc="http://schemas.openxmlformats.org/markup-compatibility/2006">
-        <mc:Choice xmlns:a14="http://schemas.microsoft.com/office/drawing/2010/main" Requires="a14">
+      <mc:AlternateContent xmlns:mc="http://schemas.openxmlformats.org/markup-compatibility/2006" xmlns:a14="http://schemas.microsoft.com/office/drawing/2010/main">
+        <mc:Choice Requires="a14">
           <p:sp>
             <p:nvSpPr>
               <p:cNvPr id="20" name="직사각형 19"/>
@@ -9656,6 +9713,7 @@
                         <a:solidFill>
                           <a:schemeClr val="tx1"/>
                         </a:solidFill>
+                        <a:latin typeface="Cambria Math" panose="02040503050406030204" pitchFamily="18" charset="0"/>
                       </a:rPr>
                       <m:t>&lt;</m:t>
                     </m:r>
@@ -9676,6 +9734,7 @@
                         <a:solidFill>
                           <a:schemeClr val="tx1"/>
                         </a:solidFill>
+                        <a:latin typeface="Cambria Math" panose="02040503050406030204" pitchFamily="18" charset="0"/>
                       </a:rPr>
                       <m:t> ≪ </m:t>
                     </m:r>
@@ -9689,11 +9748,6 @@
                   </a:rPr>
                   <a:t>Mean </a:t>
                 </a:r>
-                <a:endParaRPr lang="en-US" altLang="ko-KR" b="1" dirty="0">
-                  <a:solidFill>
-                    <a:schemeClr val="tx1"/>
-                  </a:solidFill>
-                </a:endParaRPr>
               </a:p>
               <a:p>
                 <a:r>
@@ -9732,7 +9786,7 @@
             </p:txBody>
           </p:sp>
         </mc:Choice>
-        <mc:Fallback>
+        <mc:Fallback xmlns="">
           <p:sp>
             <p:nvSpPr>
               <p:cNvPr id="20" name="직사각형 19"/>
@@ -9900,11 +9954,7 @@
           <a:p>
             <a:r>
               <a:rPr lang="ko-KR" altLang="en-US" dirty="0" smtClean="0"/>
-              <a:t>로그 </a:t>
-            </a:r>
-            <a:r>
-              <a:rPr lang="ko-KR" altLang="en-US" dirty="0" smtClean="0"/>
-              <a:t>데이터</a:t>
+              <a:t>로그 데이터</a:t>
             </a:r>
             <a:endParaRPr lang="en-US" altLang="ko-KR" dirty="0" smtClean="0"/>
           </a:p>
@@ -9948,11 +9998,7 @@
           <a:p>
             <a:r>
               <a:rPr lang="ko-KR" altLang="en-US" dirty="0" smtClean="0"/>
-              <a:t>분석 </a:t>
-            </a:r>
-            <a:r>
-              <a:rPr lang="ko-KR" altLang="en-US" dirty="0" smtClean="0"/>
-              <a:t>결과</a:t>
+              <a:t>분석 결과</a:t>
             </a:r>
             <a:endParaRPr lang="en-US" altLang="ko-KR" dirty="0" smtClean="0"/>
           </a:p>
@@ -13529,15 +13575,7 @@
                   <a:srgbClr val="00B050"/>
                 </a:solidFill>
               </a:rPr>
-              <a:t>Good </a:t>
-            </a:r>
-            <a:r>
-              <a:rPr lang="en-US" altLang="ko-KR" sz="2000" b="1" dirty="0" smtClean="0">
-                <a:solidFill>
-                  <a:srgbClr val="00B050"/>
-                </a:solidFill>
-              </a:rPr>
-              <a:t>user</a:t>
+              <a:t>Good user</a:t>
             </a:r>
             <a:endParaRPr lang="ko-KR" altLang="en-US" sz="2000" b="1" dirty="0" smtClean="0">
               <a:solidFill>
@@ -13956,11 +13994,7 @@
           <a:p>
             <a:r>
               <a:rPr lang="en-US" altLang="ko-KR" dirty="0" smtClean="0"/>
-              <a:t>E</a:t>
-            </a:r>
-            <a:r>
-              <a:rPr lang="en-US" altLang="ko-KR" dirty="0" smtClean="0"/>
-              <a:t>vent distribution</a:t>
+              <a:t>Event distribution</a:t>
             </a:r>
             <a:r>
               <a:rPr lang="ko-KR" altLang="en-US" dirty="0" smtClean="0"/>
@@ -14069,8 +14103,8 @@
           </a:p>
         </p:txBody>
       </p:sp>
-      <mc:AlternateContent xmlns:mc="http://schemas.openxmlformats.org/markup-compatibility/2006">
-        <mc:Choice xmlns:a14="http://schemas.microsoft.com/office/drawing/2010/main" Requires="a14">
+      <mc:AlternateContent xmlns:mc="http://schemas.openxmlformats.org/markup-compatibility/2006" xmlns:a14="http://schemas.microsoft.com/office/drawing/2010/main">
+        <mc:Choice Requires="a14">
           <p:sp>
             <p:nvSpPr>
               <p:cNvPr id="3" name="내용 개체 틀 2"/>
@@ -14496,13 +14530,7 @@
                       <a:rPr lang="en-US" altLang="ko-KR" i="1" dirty="0">
                         <a:latin typeface="Cambria Math" panose="02040503050406030204" pitchFamily="18" charset="0"/>
                       </a:rPr>
-                      <m:t>, </m:t>
-                    </m:r>
-                    <m:r>
-                      <a:rPr lang="en-US" altLang="ko-KR" i="1" dirty="0" smtClean="0">
-                        <a:latin typeface="Cambria Math" panose="02040503050406030204" pitchFamily="18" charset="0"/>
-                      </a:rPr>
-                      <m:t>#(0~5</m:t>
+                      <m:t>, #(0~5</m:t>
                     </m:r>
                     <m:r>
                       <a:rPr lang="ko-KR" altLang="en-US" i="1" dirty="0" smtClean="0">
@@ -14561,7 +14589,7 @@
             </p:txBody>
           </p:sp>
         </mc:Choice>
-        <mc:Fallback>
+        <mc:Fallback xmlns="">
           <p:sp>
             <p:nvSpPr>
               <p:cNvPr id="3" name="내용 개체 틀 2"/>
@@ -14628,11 +14656,11 @@
   <p:clrMapOvr>
     <a:masterClrMapping/>
   </p:clrMapOvr>
-  <mc:AlternateContent xmlns:mc="http://schemas.openxmlformats.org/markup-compatibility/2006">
-    <mc:Choice xmlns:p14="http://schemas.microsoft.com/office/powerpoint/2010/main" Requires="p14">
+  <mc:AlternateContent xmlns:mc="http://schemas.openxmlformats.org/markup-compatibility/2006" xmlns:p14="http://schemas.microsoft.com/office/powerpoint/2010/main">
+    <mc:Choice Requires="p14">
       <p:transition p14:dur="0"/>
     </mc:Choice>
-    <mc:Fallback>
+    <mc:Fallback xmlns="">
       <p:transition/>
     </mc:Fallback>
   </mc:AlternateContent>
@@ -14753,11 +14781,11 @@
   <p:clrMapOvr>
     <a:masterClrMapping/>
   </p:clrMapOvr>
-  <mc:AlternateContent xmlns:mc="http://schemas.openxmlformats.org/markup-compatibility/2006">
-    <mc:Choice xmlns:p14="http://schemas.microsoft.com/office/powerpoint/2010/main" Requires="p14">
+  <mc:AlternateContent xmlns:mc="http://schemas.openxmlformats.org/markup-compatibility/2006" xmlns:p14="http://schemas.microsoft.com/office/powerpoint/2010/main">
+    <mc:Choice Requires="p14">
       <p:transition p14:dur="0"/>
     </mc:Choice>
-    <mc:Fallback>
+    <mc:Fallback xmlns="">
       <p:transition/>
     </mc:Fallback>
   </mc:AlternateContent>
@@ -14882,11 +14910,11 @@
   <p:clrMapOvr>
     <a:masterClrMapping/>
   </p:clrMapOvr>
-  <mc:AlternateContent xmlns:mc="http://schemas.openxmlformats.org/markup-compatibility/2006">
-    <mc:Choice xmlns:p14="http://schemas.microsoft.com/office/powerpoint/2010/main" Requires="p14">
+  <mc:AlternateContent xmlns:mc="http://schemas.openxmlformats.org/markup-compatibility/2006" xmlns:p14="http://schemas.microsoft.com/office/powerpoint/2010/main">
+    <mc:Choice Requires="p14">
       <p:transition p14:dur="0"/>
     </mc:Choice>
-    <mc:Fallback>
+    <mc:Fallback xmlns="">
       <p:transition/>
     </mc:Fallback>
   </mc:AlternateContent>
@@ -15100,15 +15128,7 @@
             <a:pPr lvl="1"/>
             <a:r>
               <a:rPr lang="ko-KR" altLang="en-US" dirty="0" smtClean="0"/>
-              <a:t>한 </a:t>
-            </a:r>
-            <a:r>
-              <a:rPr lang="ko-KR" altLang="en-US" dirty="0" smtClean="0"/>
-              <a:t>학생이</a:t>
-            </a:r>
-            <a:r>
-              <a:rPr lang="ko-KR" altLang="en-US" dirty="0" smtClean="0"/>
-              <a:t> </a:t>
+              <a:t>한 학생이 </a:t>
             </a:r>
             <a:r>
               <a:rPr lang="ko-KR" altLang="en-US" dirty="0"/>
@@ -15323,11 +15343,11 @@
   <p:clrMapOvr>
     <a:masterClrMapping/>
   </p:clrMapOvr>
-  <mc:AlternateContent xmlns:mc="http://schemas.openxmlformats.org/markup-compatibility/2006">
-    <mc:Choice xmlns:p14="http://schemas.microsoft.com/office/powerpoint/2010/main" Requires="p14">
+  <mc:AlternateContent xmlns:mc="http://schemas.openxmlformats.org/markup-compatibility/2006" xmlns:p14="http://schemas.microsoft.com/office/powerpoint/2010/main">
+    <mc:Choice Requires="p14">
       <p:transition p14:dur="0"/>
     </mc:Choice>
-    <mc:Fallback>
+    <mc:Fallback xmlns="">
       <p:transition/>
     </mc:Fallback>
   </mc:AlternateContent>
@@ -15559,11 +15579,11 @@
   <p:clrMapOvr>
     <a:masterClrMapping/>
   </p:clrMapOvr>
-  <mc:AlternateContent xmlns:mc="http://schemas.openxmlformats.org/markup-compatibility/2006">
-    <mc:Choice xmlns:p14="http://schemas.microsoft.com/office/powerpoint/2010/main" Requires="p14">
+  <mc:AlternateContent xmlns:mc="http://schemas.openxmlformats.org/markup-compatibility/2006" xmlns:p14="http://schemas.microsoft.com/office/powerpoint/2010/main">
+    <mc:Choice Requires="p14">
       <p:transition p14:dur="0"/>
     </mc:Choice>
-    <mc:Fallback>
+    <mc:Fallback xmlns="">
       <p:transition/>
     </mc:Fallback>
   </mc:AlternateContent>
@@ -15821,11 +15841,11 @@
   <p:clrMapOvr>
     <a:masterClrMapping/>
   </p:clrMapOvr>
-  <mc:AlternateContent xmlns:mc="http://schemas.openxmlformats.org/markup-compatibility/2006">
-    <mc:Choice xmlns:p14="http://schemas.microsoft.com/office/powerpoint/2010/main" Requires="p14">
+  <mc:AlternateContent xmlns:mc="http://schemas.openxmlformats.org/markup-compatibility/2006" xmlns:p14="http://schemas.microsoft.com/office/powerpoint/2010/main">
+    <mc:Choice Requires="p14">
       <p:transition p14:dur="0"/>
     </mc:Choice>
-    <mc:Fallback>
+    <mc:Fallback xmlns="">
       <p:transition/>
     </mc:Fallback>
   </mc:AlternateContent>
@@ -16267,11 +16287,11 @@
   <p:clrMapOvr>
     <a:masterClrMapping/>
   </p:clrMapOvr>
-  <mc:AlternateContent xmlns:mc="http://schemas.openxmlformats.org/markup-compatibility/2006">
-    <mc:Choice xmlns:p14="http://schemas.microsoft.com/office/powerpoint/2010/main" Requires="p14">
+  <mc:AlternateContent xmlns:mc="http://schemas.openxmlformats.org/markup-compatibility/2006" xmlns:p14="http://schemas.microsoft.com/office/powerpoint/2010/main">
+    <mc:Choice Requires="p14">
       <p:transition p14:dur="0"/>
     </mc:Choice>
-    <mc:Fallback>
+    <mc:Fallback xmlns="">
       <p:transition/>
     </mc:Fallback>
   </mc:AlternateContent>
@@ -17445,7 +17465,6 @@
               <a:rPr lang="en-US" altLang="ko-KR" dirty="0" smtClean="0"/>
               <a:t>others type: go east, go west, turn left…</a:t>
             </a:r>
-            <a:endParaRPr lang="en-US" altLang="ko-KR" dirty="0" smtClean="0"/>
           </a:p>
           <a:p>
             <a:pPr lvl="1"/>
@@ -17695,8 +17714,8 @@
           </a:p>
         </p:txBody>
       </p:sp>
-      <mc:AlternateContent xmlns:mc="http://schemas.openxmlformats.org/markup-compatibility/2006">
-        <mc:Choice xmlns:a14="http://schemas.microsoft.com/office/drawing/2010/main" Requires="a14">
+      <mc:AlternateContent xmlns:mc="http://schemas.openxmlformats.org/markup-compatibility/2006" xmlns:a14="http://schemas.microsoft.com/office/drawing/2010/main">
+        <mc:Choice Requires="a14">
           <p:sp>
             <p:nvSpPr>
               <p:cNvPr id="3" name="내용 개체 틀 2"/>
@@ -17820,7 +17839,7 @@
             </p:txBody>
           </p:sp>
         </mc:Choice>
-        <mc:Fallback>
+        <mc:Fallback xmlns="">
           <p:sp>
             <p:nvSpPr>
               <p:cNvPr id="3" name="내용 개체 틀 2"/>
@@ -17877,8 +17896,8 @@
           </a:p>
         </p:txBody>
       </p:sp>
-      <mc:AlternateContent xmlns:mc="http://schemas.openxmlformats.org/markup-compatibility/2006">
-        <mc:Choice xmlns:a14="http://schemas.microsoft.com/office/drawing/2010/main" Requires="a14">
+      <mc:AlternateContent xmlns:mc="http://schemas.openxmlformats.org/markup-compatibility/2006" xmlns:a14="http://schemas.microsoft.com/office/drawing/2010/main">
+        <mc:Choice Requires="a14">
           <p:graphicFrame>
             <p:nvGraphicFramePr>
               <p:cNvPr id="11" name="표 10"/>
@@ -18439,11 +18458,7 @@
                           </a:pPr>
                           <a:r>
                             <a:rPr lang="en-US" altLang="ko-KR" dirty="0" smtClean="0"/>
-                            <a:t>(insert, </a:t>
-                          </a:r>
-                          <a:r>
-                            <a:rPr lang="en-US" altLang="ko-KR" dirty="0" smtClean="0"/>
-                            <a:t>if, </a:t>
+                            <a:t>(insert, if, </a:t>
                           </a:r>
                           <a14:m>
                             <m:oMath xmlns:m="http://schemas.openxmlformats.org/officeDocument/2006/math">
@@ -18613,7 +18628,7 @@
             </a:graphic>
           </p:graphicFrame>
         </mc:Choice>
-        <mc:Fallback>
+        <mc:Fallback xmlns="">
           <p:graphicFrame>
             <p:nvGraphicFramePr>
               <p:cNvPr id="11" name="표 10"/>
@@ -18899,11 +18914,11 @@
   <p:clrMapOvr>
     <a:masterClrMapping/>
   </p:clrMapOvr>
-  <mc:AlternateContent xmlns:mc="http://schemas.openxmlformats.org/markup-compatibility/2006">
-    <mc:Choice xmlns:p14="http://schemas.microsoft.com/office/powerpoint/2010/main" Requires="p14">
+  <mc:AlternateContent xmlns:mc="http://schemas.openxmlformats.org/markup-compatibility/2006" xmlns:p14="http://schemas.microsoft.com/office/powerpoint/2010/main">
+    <mc:Choice Requires="p14">
       <p:transition p14:dur="0"/>
     </mc:Choice>
-    <mc:Fallback>
+    <mc:Fallback xmlns="">
       <p:transition/>
     </mc:Fallback>
   </mc:AlternateContent>
@@ -18961,13 +18976,7 @@
               <a:rPr lang="en-US" altLang="ko-KR" dirty="0" smtClean="0">
                 <a:effectLst/>
               </a:rPr>
-              <a:t>(</a:t>
-            </a:r>
-            <a:r>
-              <a:rPr lang="en-US" altLang="ko-KR" dirty="0" smtClean="0">
-                <a:effectLst/>
-              </a:rPr>
-              <a:t>cont’d)</a:t>
+              <a:t>(cont’d)</a:t>
             </a:r>
             <a:r>
               <a:rPr lang="ko-KR" altLang="en-US" dirty="0" smtClean="0">
@@ -19628,8 +19637,8 @@
           </a:graphicData>
         </a:graphic>
       </p:graphicFrame>
-      <mc:AlternateContent xmlns:mc="http://schemas.openxmlformats.org/markup-compatibility/2006">
-        <mc:Choice xmlns:a14="http://schemas.microsoft.com/office/drawing/2010/main" Requires="a14">
+      <mc:AlternateContent xmlns:mc="http://schemas.openxmlformats.org/markup-compatibility/2006" xmlns:a14="http://schemas.microsoft.com/office/drawing/2010/main">
+        <mc:Choice Requires="a14">
           <p:sp>
             <p:nvSpPr>
               <p:cNvPr id="6" name="직사각형 5"/>
@@ -19836,7 +19845,7 @@
             </p:txBody>
           </p:sp>
         </mc:Choice>
-        <mc:Fallback>
+        <mc:Fallback xmlns="">
           <p:sp>
             <p:nvSpPr>
               <p:cNvPr id="6" name="직사각형 5"/>

</xml_diff>